<commit_message>
Aario's Code Style Guide.ppt
</commit_message>
<xml_diff>
--- a/Aario-PPT/IT/1. 智能硬件和移动互联网，该用什么语言？.pptx
+++ b/Aario-PPT/IT/1. 智能硬件和移动互联网，该用什么语言？.pptx
@@ -113,7 +113,7 @@
   </p:defaultTextStyle>
   <p:extLst>
     <p:ext uri="{EFAFB233-063F-42B5-8137-9DF3F51BA10A}">
-      <p15:sldGuideLst xmlns="" xmlns:p15="http://schemas.microsoft.com/office/powerpoint/2012/main"/>
+      <p15:sldGuideLst xmlns:p15="http://schemas.microsoft.com/office/powerpoint/2012/main" xmlns=""/>
     </p:ext>
   </p:extLst>
 </p:presentation>
@@ -381,11 +381,11 @@
         </c:dLbls>
         <c:gapWidth val="219"/>
         <c:overlap val="-27"/>
-        <c:axId val="134356992"/>
-        <c:axId val="134358144"/>
+        <c:axId val="50190592"/>
+        <c:axId val="50196480"/>
       </c:barChart>
       <c:catAx>
-        <c:axId val="134356992"/>
+        <c:axId val="50190592"/>
         <c:scaling>
           <c:orientation val="minMax"/>
         </c:scaling>
@@ -428,7 +428,7 @@
             <a:endParaRPr lang="zh-CN"/>
           </a:p>
         </c:txPr>
-        <c:crossAx val="134358144"/>
+        <c:crossAx val="50196480"/>
         <c:crosses val="autoZero"/>
         <c:auto val="1"/>
         <c:lblAlgn val="ctr"/>
@@ -436,7 +436,7 @@
         <c:noMultiLvlLbl val="0"/>
       </c:catAx>
       <c:valAx>
-        <c:axId val="134358144"/>
+        <c:axId val="50196480"/>
         <c:scaling>
           <c:orientation val="minMax"/>
         </c:scaling>
@@ -487,7 +487,7 @@
             <a:endParaRPr lang="zh-CN"/>
           </a:p>
         </c:txPr>
-        <c:crossAx val="134356992"/>
+        <c:crossAx val="50190592"/>
         <c:crosses val="autoZero"/>
         <c:crossBetween val="between"/>
       </c:valAx>
@@ -818,11 +818,11 @@
         </c:dLbls>
         <c:gapWidth val="219"/>
         <c:overlap val="-27"/>
-        <c:axId val="134591232"/>
-        <c:axId val="134592768"/>
+        <c:axId val="131923328"/>
+        <c:axId val="131929216"/>
       </c:barChart>
       <c:catAx>
-        <c:axId val="134591232"/>
+        <c:axId val="131923328"/>
         <c:scaling>
           <c:orientation val="minMax"/>
         </c:scaling>
@@ -865,7 +865,7 @@
             <a:endParaRPr lang="zh-CN"/>
           </a:p>
         </c:txPr>
-        <c:crossAx val="134592768"/>
+        <c:crossAx val="131929216"/>
         <c:crosses val="autoZero"/>
         <c:auto val="1"/>
         <c:lblAlgn val="ctr"/>
@@ -873,7 +873,7 @@
         <c:noMultiLvlLbl val="0"/>
       </c:catAx>
       <c:valAx>
-        <c:axId val="134592768"/>
+        <c:axId val="131929216"/>
         <c:scaling>
           <c:orientation val="minMax"/>
         </c:scaling>
@@ -924,7 +924,7 @@
             <a:endParaRPr lang="zh-CN"/>
           </a:p>
         </c:txPr>
-        <c:crossAx val="134591232"/>
+        <c:crossAx val="131923328"/>
         <c:crosses val="autoZero"/>
         <c:crossBetween val="between"/>
       </c:valAx>
@@ -1279,11 +1279,11 @@
         </c:dLbls>
         <c:gapWidth val="219"/>
         <c:overlap val="-27"/>
-        <c:axId val="135075328"/>
-        <c:axId val="135076864"/>
+        <c:axId val="130417024"/>
+        <c:axId val="130418560"/>
       </c:barChart>
       <c:catAx>
-        <c:axId val="135075328"/>
+        <c:axId val="130417024"/>
         <c:scaling>
           <c:orientation val="minMax"/>
         </c:scaling>
@@ -1326,7 +1326,7 @@
             <a:endParaRPr lang="zh-CN"/>
           </a:p>
         </c:txPr>
-        <c:crossAx val="135076864"/>
+        <c:crossAx val="130418560"/>
         <c:crosses val="autoZero"/>
         <c:auto val="1"/>
         <c:lblAlgn val="ctr"/>
@@ -1334,7 +1334,7 @@
         <c:noMultiLvlLbl val="0"/>
       </c:catAx>
       <c:valAx>
-        <c:axId val="135076864"/>
+        <c:axId val="130418560"/>
         <c:scaling>
           <c:orientation val="minMax"/>
         </c:scaling>
@@ -1385,7 +1385,7 @@
             <a:endParaRPr lang="zh-CN"/>
           </a:p>
         </c:txPr>
-        <c:crossAx val="135075328"/>
+        <c:crossAx val="130417024"/>
         <c:crosses val="autoZero"/>
         <c:crossBetween val="between"/>
       </c:valAx>
@@ -1794,11 +1794,11 @@
         </c:dLbls>
         <c:gapWidth val="219"/>
         <c:overlap val="-27"/>
-        <c:axId val="135182592"/>
-        <c:axId val="135188480"/>
+        <c:axId val="130480384"/>
+        <c:axId val="170790912"/>
       </c:barChart>
       <c:catAx>
-        <c:axId val="135182592"/>
+        <c:axId val="130480384"/>
         <c:scaling>
           <c:orientation val="minMax"/>
         </c:scaling>
@@ -1841,7 +1841,7 @@
             <a:endParaRPr lang="zh-CN"/>
           </a:p>
         </c:txPr>
-        <c:crossAx val="135188480"/>
+        <c:crossAx val="170790912"/>
         <c:crosses val="autoZero"/>
         <c:auto val="1"/>
         <c:lblAlgn val="ctr"/>
@@ -1849,7 +1849,7 @@
         <c:noMultiLvlLbl val="0"/>
       </c:catAx>
       <c:valAx>
-        <c:axId val="135188480"/>
+        <c:axId val="170790912"/>
         <c:scaling>
           <c:orientation val="minMax"/>
         </c:scaling>
@@ -1900,7 +1900,7 @@
             <a:endParaRPr lang="zh-CN"/>
           </a:p>
         </c:txPr>
-        <c:crossAx val="135182592"/>
+        <c:crossAx val="130480384"/>
         <c:crosses val="autoZero"/>
         <c:crossBetween val="between"/>
       </c:valAx>
@@ -4274,7 +4274,7 @@
           <a:p>
             <a:fld id="{D1CEB0FD-D693-4ACC-9105-B0437DA2433E}" type="datetimeFigureOut">
               <a:rPr lang="zh-CN" altLang="en-US" smtClean="0"/>
-              <a:t>2016/7/27</a:t>
+              <a:t>2016/7/28</a:t>
             </a:fld>
             <a:endParaRPr lang="zh-CN" altLang="en-US"/>
           </a:p>
@@ -4444,7 +4444,7 @@
           <a:p>
             <a:fld id="{D1CEB0FD-D693-4ACC-9105-B0437DA2433E}" type="datetimeFigureOut">
               <a:rPr lang="zh-CN" altLang="en-US" smtClean="0"/>
-              <a:t>2016/7/27</a:t>
+              <a:t>2016/7/28</a:t>
             </a:fld>
             <a:endParaRPr lang="zh-CN" altLang="en-US"/>
           </a:p>
@@ -4624,7 +4624,7 @@
           <a:p>
             <a:fld id="{D1CEB0FD-D693-4ACC-9105-B0437DA2433E}" type="datetimeFigureOut">
               <a:rPr lang="zh-CN" altLang="en-US" smtClean="0"/>
-              <a:t>2016/7/27</a:t>
+              <a:t>2016/7/28</a:t>
             </a:fld>
             <a:endParaRPr lang="zh-CN" altLang="en-US"/>
           </a:p>
@@ -4794,7 +4794,7 @@
           <a:p>
             <a:fld id="{D1CEB0FD-D693-4ACC-9105-B0437DA2433E}" type="datetimeFigureOut">
               <a:rPr lang="zh-CN" altLang="en-US" smtClean="0"/>
-              <a:t>2016/7/27</a:t>
+              <a:t>2016/7/28</a:t>
             </a:fld>
             <a:endParaRPr lang="zh-CN" altLang="en-US"/>
           </a:p>
@@ -5040,7 +5040,7 @@
           <a:p>
             <a:fld id="{D1CEB0FD-D693-4ACC-9105-B0437DA2433E}" type="datetimeFigureOut">
               <a:rPr lang="zh-CN" altLang="en-US" smtClean="0"/>
-              <a:t>2016/7/27</a:t>
+              <a:t>2016/7/28</a:t>
             </a:fld>
             <a:endParaRPr lang="zh-CN" altLang="en-US"/>
           </a:p>
@@ -5272,7 +5272,7 @@
           <a:p>
             <a:fld id="{D1CEB0FD-D693-4ACC-9105-B0437DA2433E}" type="datetimeFigureOut">
               <a:rPr lang="zh-CN" altLang="en-US" smtClean="0"/>
-              <a:t>2016/7/27</a:t>
+              <a:t>2016/7/28</a:t>
             </a:fld>
             <a:endParaRPr lang="zh-CN" altLang="en-US"/>
           </a:p>
@@ -5639,7 +5639,7 @@
           <a:p>
             <a:fld id="{D1CEB0FD-D693-4ACC-9105-B0437DA2433E}" type="datetimeFigureOut">
               <a:rPr lang="zh-CN" altLang="en-US" smtClean="0"/>
-              <a:t>2016/7/27</a:t>
+              <a:t>2016/7/28</a:t>
             </a:fld>
             <a:endParaRPr lang="zh-CN" altLang="en-US"/>
           </a:p>
@@ -5757,7 +5757,7 @@
           <a:p>
             <a:fld id="{D1CEB0FD-D693-4ACC-9105-B0437DA2433E}" type="datetimeFigureOut">
               <a:rPr lang="zh-CN" altLang="en-US" smtClean="0"/>
-              <a:t>2016/7/27</a:t>
+              <a:t>2016/7/28</a:t>
             </a:fld>
             <a:endParaRPr lang="zh-CN" altLang="en-US"/>
           </a:p>
@@ -5852,7 +5852,7 @@
           <a:p>
             <a:fld id="{D1CEB0FD-D693-4ACC-9105-B0437DA2433E}" type="datetimeFigureOut">
               <a:rPr lang="zh-CN" altLang="en-US" smtClean="0"/>
-              <a:t>2016/7/27</a:t>
+              <a:t>2016/7/28</a:t>
             </a:fld>
             <a:endParaRPr lang="zh-CN" altLang="en-US"/>
           </a:p>
@@ -6129,7 +6129,7 @@
           <a:p>
             <a:fld id="{D1CEB0FD-D693-4ACC-9105-B0437DA2433E}" type="datetimeFigureOut">
               <a:rPr lang="zh-CN" altLang="en-US" smtClean="0"/>
-              <a:t>2016/7/27</a:t>
+              <a:t>2016/7/28</a:t>
             </a:fld>
             <a:endParaRPr lang="zh-CN" altLang="en-US"/>
           </a:p>
@@ -6382,7 +6382,7 @@
           <a:p>
             <a:fld id="{D1CEB0FD-D693-4ACC-9105-B0437DA2433E}" type="datetimeFigureOut">
               <a:rPr lang="zh-CN" altLang="en-US" smtClean="0"/>
-              <a:t>2016/7/27</a:t>
+              <a:t>2016/7/28</a:t>
             </a:fld>
             <a:endParaRPr lang="zh-CN" altLang="en-US"/>
           </a:p>
@@ -6595,7 +6595,7 @@
           <a:p>
             <a:fld id="{D1CEB0FD-D693-4ACC-9105-B0437DA2433E}" type="datetimeFigureOut">
               <a:rPr lang="zh-CN" altLang="en-US" smtClean="0"/>
-              <a:t>2016/7/27</a:t>
+              <a:t>2016/7/28</a:t>
             </a:fld>
             <a:endParaRPr lang="zh-CN" altLang="en-US"/>
           </a:p>
@@ -8141,7 +8141,12 @@
             <p:ph type="title"/>
           </p:nvPr>
         </p:nvSpPr>
-        <p:spPr/>
+        <p:spPr>
+          <a:xfrm>
+            <a:off x="838200" y="365126"/>
+            <a:ext cx="10515600" cy="813043"/>
+          </a:xfrm>
+        </p:spPr>
         <p:txBody>
           <a:bodyPr>
             <a:normAutofit/>
@@ -8174,7 +8179,7 @@
         </p:nvSpPr>
         <p:spPr>
           <a:xfrm>
-            <a:off x="855785" y="1462088"/>
+            <a:off x="908539" y="1215904"/>
             <a:ext cx="10515600" cy="5032375"/>
           </a:xfrm>
         </p:spPr>
@@ -8325,7 +8330,62 @@
                 <a:ea typeface="微软雅黑 Light" pitchFamily="34" charset="-122"/>
                 <a:cs typeface="Arial" pitchFamily="34" charset="0"/>
               </a:rPr>
-              <a:t>跨进程协作</a:t>
+              <a:t>跨网络协作</a:t>
+            </a:r>
+            <a:endParaRPr lang="en-US" altLang="zh-CN" sz="1600" dirty="0" smtClean="0">
+              <a:latin typeface="Arial" pitchFamily="34" charset="0"/>
+              <a:ea typeface="微软雅黑 Light" pitchFamily="34" charset="-122"/>
+              <a:cs typeface="Arial" pitchFamily="34" charset="0"/>
+            </a:endParaRPr>
+          </a:p>
+          <a:p>
+            <a:r>
+              <a:rPr lang="en-US" altLang="zh-CN" sz="1600" dirty="0" smtClean="0">
+                <a:latin typeface="Arial" pitchFamily="34" charset="0"/>
+                <a:ea typeface="微软雅黑 Light" pitchFamily="34" charset="-122"/>
+                <a:cs typeface="Arial" pitchFamily="34" charset="0"/>
+              </a:rPr>
+              <a:t>Unix Datagram </a:t>
+            </a:r>
+            <a:r>
+              <a:rPr lang="zh-CN" altLang="en-US" sz="1600" dirty="0" smtClean="0">
+                <a:latin typeface="Arial" pitchFamily="34" charset="0"/>
+                <a:ea typeface="微软雅黑 Light" pitchFamily="34" charset="-122"/>
+                <a:cs typeface="Arial" pitchFamily="34" charset="0"/>
+              </a:rPr>
+              <a:t>跨进程调用，开大服务器的 </a:t>
+            </a:r>
+            <a:r>
+              <a:rPr lang="en-US" altLang="zh-CN" sz="1600" dirty="0" err="1">
+                <a:latin typeface="Arial" pitchFamily="34" charset="0"/>
+                <a:ea typeface="微软雅黑 Light" pitchFamily="34" charset="-122"/>
+                <a:cs typeface="Arial" pitchFamily="34" charset="0"/>
+              </a:rPr>
+              <a:t>net.unix.max_dgram_qlen</a:t>
+            </a:r>
+            <a:r>
+              <a:rPr lang="en-US" altLang="zh-CN" sz="1600" dirty="0">
+                <a:latin typeface="Arial" pitchFamily="34" charset="0"/>
+                <a:ea typeface="微软雅黑 Light" pitchFamily="34" charset="-122"/>
+                <a:cs typeface="Arial" pitchFamily="34" charset="0"/>
+              </a:rPr>
+              <a:t> = </a:t>
+            </a:r>
+            <a:r>
+              <a:rPr lang="en-US" altLang="zh-CN" sz="1600" dirty="0" smtClean="0">
+                <a:latin typeface="Arial" pitchFamily="34" charset="0"/>
+                <a:ea typeface="微软雅黑 Light" pitchFamily="34" charset="-122"/>
+                <a:cs typeface="Arial" pitchFamily="34" charset="0"/>
+              </a:rPr>
+              <a:t>100  </a:t>
+            </a:r>
+            <a:r>
+              <a:rPr lang="zh-CN" altLang="en-US" sz="1600" dirty="0" smtClean="0">
+                <a:latin typeface="Arial" pitchFamily="34" charset="0"/>
+                <a:ea typeface="微软雅黑 Light" pitchFamily="34" charset="-122"/>
+                <a:cs typeface="Arial" pitchFamily="34" charset="0"/>
+              </a:rPr>
+              <a:t>或以上</a:t>
             </a:r>
             <a:endParaRPr lang="en-US" altLang="zh-CN" sz="1600" dirty="0" smtClean="0">
               <a:latin typeface="Arial" pitchFamily="34" charset="0"/>
@@ -8356,7 +8416,23 @@
                 <a:ea typeface="微软雅黑 Light" pitchFamily="34" charset="-122"/>
                 <a:cs typeface="Arial" pitchFamily="34" charset="0"/>
               </a:rPr>
-              <a:t>做跨进程共享内存资源方案</a:t>
+              <a:t>做</a:t>
+            </a:r>
+            <a:r>
+              <a:rPr lang="zh-CN" altLang="en-US" sz="1600" dirty="0" smtClean="0">
+                <a:latin typeface="Arial" pitchFamily="34" charset="0"/>
+                <a:ea typeface="微软雅黑 Light" pitchFamily="34" charset="-122"/>
+                <a:cs typeface="Arial" pitchFamily="34" charset="0"/>
+              </a:rPr>
+              <a:t>跨网络共享</a:t>
+            </a:r>
+            <a:r>
+              <a:rPr lang="zh-CN" altLang="en-US" sz="1600" dirty="0" smtClean="0">
+                <a:latin typeface="Arial" pitchFamily="34" charset="0"/>
+                <a:ea typeface="微软雅黑 Light" pitchFamily="34" charset="-122"/>
+                <a:cs typeface="Arial" pitchFamily="34" charset="0"/>
+              </a:rPr>
+              <a:t>内存资源方案</a:t>
             </a:r>
             <a:endParaRPr lang="en-US" altLang="zh-CN" sz="1600" dirty="0" smtClean="0">
               <a:latin typeface="Arial" pitchFamily="34" charset="0"/>
@@ -8941,11 +9017,7 @@
             <a:pPr algn="ctr"/>
             <a:r>
               <a:rPr lang="en-US" altLang="zh-CN" dirty="0" smtClean="0"/>
-              <a:t>Thanks</a:t>
-            </a:r>
-            <a:r>
-              <a:rPr lang="en-US" altLang="zh-CN" dirty="0" smtClean="0"/>
-              <a:t>, by </a:t>
+              <a:t>Thanks, by </a:t>
             </a:r>
             <a:r>
               <a:rPr lang="en-US" altLang="zh-CN" dirty="0" err="1" smtClean="0"/>
@@ -9223,7 +9295,7 @@
   <a:extraClrSchemeLst/>
   <a:extLst>
     <a:ext uri="{05A4C25C-085E-4340-85A3-A5531E510DB2}">
-      <thm15:themeFamily xmlns="" xmlns:thm15="http://schemas.microsoft.com/office/thememl/2012/main" name="Office Theme" id="{62F939B6-93AF-4DB8-9C6B-D6C7DFDC589F}" vid="{4A3C46E8-61CC-4603-A589-7422A47A8E4A}"/>
+      <thm15:themeFamily xmlns:thm15="http://schemas.microsoft.com/office/thememl/2012/main" xmlns="" name="Office Theme" id="{62F939B6-93AF-4DB8-9C6B-D6C7DFDC589F}" vid="{4A3C46E8-61CC-4603-A589-7422A47A8E4A}"/>
     </a:ext>
   </a:extLst>
 </a:theme>

</xml_diff>